<commit_message>
Move to World Orbital Prison model
Changes to skybox, lighting, graphics settings, and new room name materials
</commit_message>
<xml_diff>
--- a/Assets/Textures/Roomnames/Roomnames.pptx
+++ b/Assets/Textures/Roomnames/Roomnames.pptx
@@ -263,7 +263,7 @@
           <a:p>
             <a:fld id="{14389514-1D2E-45F5-8DC5-A75A64E20C29}" type="datetimeFigureOut">
               <a:rPr lang="en-GB" smtClean="0"/>
-              <a:t>22/09/2024</a:t>
+              <a:t>10/10/2024</a:t>
             </a:fld>
             <a:endParaRPr lang="en-GB"/>
           </a:p>
@@ -463,7 +463,7 @@
           <a:p>
             <a:fld id="{14389514-1D2E-45F5-8DC5-A75A64E20C29}" type="datetimeFigureOut">
               <a:rPr lang="en-GB" smtClean="0"/>
-              <a:t>22/09/2024</a:t>
+              <a:t>10/10/2024</a:t>
             </a:fld>
             <a:endParaRPr lang="en-GB"/>
           </a:p>
@@ -673,7 +673,7 @@
           <a:p>
             <a:fld id="{14389514-1D2E-45F5-8DC5-A75A64E20C29}" type="datetimeFigureOut">
               <a:rPr lang="en-GB" smtClean="0"/>
-              <a:t>22/09/2024</a:t>
+              <a:t>10/10/2024</a:t>
             </a:fld>
             <a:endParaRPr lang="en-GB"/>
           </a:p>
@@ -873,7 +873,7 @@
           <a:p>
             <a:fld id="{14389514-1D2E-45F5-8DC5-A75A64E20C29}" type="datetimeFigureOut">
               <a:rPr lang="en-GB" smtClean="0"/>
-              <a:t>22/09/2024</a:t>
+              <a:t>10/10/2024</a:t>
             </a:fld>
             <a:endParaRPr lang="en-GB"/>
           </a:p>
@@ -1149,7 +1149,7 @@
           <a:p>
             <a:fld id="{14389514-1D2E-45F5-8DC5-A75A64E20C29}" type="datetimeFigureOut">
               <a:rPr lang="en-GB" smtClean="0"/>
-              <a:t>22/09/2024</a:t>
+              <a:t>10/10/2024</a:t>
             </a:fld>
             <a:endParaRPr lang="en-GB"/>
           </a:p>
@@ -1417,7 +1417,7 @@
           <a:p>
             <a:fld id="{14389514-1D2E-45F5-8DC5-A75A64E20C29}" type="datetimeFigureOut">
               <a:rPr lang="en-GB" smtClean="0"/>
-              <a:t>22/09/2024</a:t>
+              <a:t>10/10/2024</a:t>
             </a:fld>
             <a:endParaRPr lang="en-GB"/>
           </a:p>
@@ -1832,7 +1832,7 @@
           <a:p>
             <a:fld id="{14389514-1D2E-45F5-8DC5-A75A64E20C29}" type="datetimeFigureOut">
               <a:rPr lang="en-GB" smtClean="0"/>
-              <a:t>22/09/2024</a:t>
+              <a:t>10/10/2024</a:t>
             </a:fld>
             <a:endParaRPr lang="en-GB"/>
           </a:p>
@@ -1974,7 +1974,7 @@
           <a:p>
             <a:fld id="{14389514-1D2E-45F5-8DC5-A75A64E20C29}" type="datetimeFigureOut">
               <a:rPr lang="en-GB" smtClean="0"/>
-              <a:t>22/09/2024</a:t>
+              <a:t>10/10/2024</a:t>
             </a:fld>
             <a:endParaRPr lang="en-GB"/>
           </a:p>
@@ -2087,7 +2087,7 @@
           <a:p>
             <a:fld id="{14389514-1D2E-45F5-8DC5-A75A64E20C29}" type="datetimeFigureOut">
               <a:rPr lang="en-GB" smtClean="0"/>
-              <a:t>22/09/2024</a:t>
+              <a:t>10/10/2024</a:t>
             </a:fld>
             <a:endParaRPr lang="en-GB"/>
           </a:p>
@@ -2400,7 +2400,7 @@
           <a:p>
             <a:fld id="{14389514-1D2E-45F5-8DC5-A75A64E20C29}" type="datetimeFigureOut">
               <a:rPr lang="en-GB" smtClean="0"/>
-              <a:t>22/09/2024</a:t>
+              <a:t>10/10/2024</a:t>
             </a:fld>
             <a:endParaRPr lang="en-GB"/>
           </a:p>
@@ -2689,7 +2689,7 @@
           <a:p>
             <a:fld id="{14389514-1D2E-45F5-8DC5-A75A64E20C29}" type="datetimeFigureOut">
               <a:rPr lang="en-GB" smtClean="0"/>
-              <a:t>22/09/2024</a:t>
+              <a:t>10/10/2024</a:t>
             </a:fld>
             <a:endParaRPr lang="en-GB"/>
           </a:p>
@@ -2932,7 +2932,7 @@
           <a:p>
             <a:fld id="{14389514-1D2E-45F5-8DC5-A75A64E20C29}" type="datetimeFigureOut">
               <a:rPr lang="en-GB" smtClean="0"/>
-              <a:t>22/09/2024</a:t>
+              <a:t>10/10/2024</a:t>
             </a:fld>
             <a:endParaRPr lang="en-GB"/>
           </a:p>
@@ -3645,6 +3645,96 @@
           </a:p>
         </p:txBody>
       </p:sp>
+      <p:sp>
+        <p:nvSpPr>
+          <p:cNvPr id="7" name="TextBox 6">
+            <a:extLst>
+              <a:ext uri="{FF2B5EF4-FFF2-40B4-BE49-F238E27FC236}">
+                <a16:creationId xmlns:a16="http://schemas.microsoft.com/office/drawing/2014/main" id="{84C03903-AFB1-4559-E65D-E9C976966460}"/>
+              </a:ext>
+            </a:extLst>
+          </p:cNvPr>
+          <p:cNvSpPr txBox="1"/>
+          <p:nvPr/>
+        </p:nvSpPr>
+        <p:spPr>
+          <a:xfrm>
+            <a:off x="5954131" y="734584"/>
+            <a:ext cx="5040000" cy="1440000"/>
+          </a:xfrm>
+          <a:prstGeom prst="rect">
+            <a:avLst/>
+          </a:prstGeom>
+          <a:noFill/>
+        </p:spPr>
+        <p:txBody>
+          <a:bodyPr wrap="none" rtlCol="0" anchor="ctr">
+            <a:noAutofit/>
+          </a:bodyPr>
+          <a:lstStyle/>
+          <a:p>
+            <a:pPr algn="ctr"/>
+            <a:r>
+              <a:rPr lang="en-GB" sz="6000" dirty="0">
+                <a:ln w="0"/>
+                <a:effectLst>
+                  <a:outerShdw blurRad="38100" dist="19050" dir="2700000" algn="tl" rotWithShape="0">
+                    <a:schemeClr val="dk1">
+                      <a:alpha val="40000"/>
+                    </a:schemeClr>
+                  </a:outerShdw>
+                </a:effectLst>
+              </a:rPr>
+              <a:t>MEDICAL</a:t>
+            </a:r>
+          </a:p>
+        </p:txBody>
+      </p:sp>
+      <p:sp>
+        <p:nvSpPr>
+          <p:cNvPr id="8" name="TextBox 7">
+            <a:extLst>
+              <a:ext uri="{FF2B5EF4-FFF2-40B4-BE49-F238E27FC236}">
+                <a16:creationId xmlns:a16="http://schemas.microsoft.com/office/drawing/2014/main" id="{EF61FDA3-C4FE-00DA-587F-8051C1FDA452}"/>
+              </a:ext>
+            </a:extLst>
+          </p:cNvPr>
+          <p:cNvSpPr txBox="1"/>
+          <p:nvPr/>
+        </p:nvSpPr>
+        <p:spPr>
+          <a:xfrm>
+            <a:off x="5954131" y="3429000"/>
+            <a:ext cx="5040000" cy="1440000"/>
+          </a:xfrm>
+          <a:prstGeom prst="rect">
+            <a:avLst/>
+          </a:prstGeom>
+          <a:noFill/>
+        </p:spPr>
+        <p:txBody>
+          <a:bodyPr wrap="none" rtlCol="0" anchor="ctr">
+            <a:noAutofit/>
+          </a:bodyPr>
+          <a:lstStyle/>
+          <a:p>
+            <a:pPr algn="ctr"/>
+            <a:r>
+              <a:rPr lang="en-GB" sz="6000" dirty="0">
+                <a:ln w="0"/>
+                <a:effectLst>
+                  <a:outerShdw blurRad="38100" dist="19050" dir="2700000" algn="tl" rotWithShape="0">
+                    <a:schemeClr val="dk1">
+                      <a:alpha val="40000"/>
+                    </a:schemeClr>
+                  </a:outerShdw>
+                </a:effectLst>
+              </a:rPr>
+              <a:t>PROPERTY</a:t>
+            </a:r>
+          </a:p>
+        </p:txBody>
+      </p:sp>
     </p:spTree>
     <p:extLst>
       <p:ext uri="{BB962C8B-B14F-4D97-AF65-F5344CB8AC3E}">

</xml_diff>

<commit_message>
Playing Audio Clips and displaying Game Messages
Unbundled this capability into two separate scripts
</commit_message>
<xml_diff>
--- a/Assets/Textures/Roomnames/Roomnames.pptx
+++ b/Assets/Textures/Roomnames/Roomnames.pptx
@@ -263,7 +263,7 @@
           <a:p>
             <a:fld id="{14389514-1D2E-45F5-8DC5-A75A64E20C29}" type="datetimeFigureOut">
               <a:rPr lang="en-GB" smtClean="0"/>
-              <a:t>10/10/2024</a:t>
+              <a:t>12/10/2024</a:t>
             </a:fld>
             <a:endParaRPr lang="en-GB"/>
           </a:p>
@@ -463,7 +463,7 @@
           <a:p>
             <a:fld id="{14389514-1D2E-45F5-8DC5-A75A64E20C29}" type="datetimeFigureOut">
               <a:rPr lang="en-GB" smtClean="0"/>
-              <a:t>10/10/2024</a:t>
+              <a:t>12/10/2024</a:t>
             </a:fld>
             <a:endParaRPr lang="en-GB"/>
           </a:p>
@@ -673,7 +673,7 @@
           <a:p>
             <a:fld id="{14389514-1D2E-45F5-8DC5-A75A64E20C29}" type="datetimeFigureOut">
               <a:rPr lang="en-GB" smtClean="0"/>
-              <a:t>10/10/2024</a:t>
+              <a:t>12/10/2024</a:t>
             </a:fld>
             <a:endParaRPr lang="en-GB"/>
           </a:p>
@@ -873,7 +873,7 @@
           <a:p>
             <a:fld id="{14389514-1D2E-45F5-8DC5-A75A64E20C29}" type="datetimeFigureOut">
               <a:rPr lang="en-GB" smtClean="0"/>
-              <a:t>10/10/2024</a:t>
+              <a:t>12/10/2024</a:t>
             </a:fld>
             <a:endParaRPr lang="en-GB"/>
           </a:p>
@@ -1149,7 +1149,7 @@
           <a:p>
             <a:fld id="{14389514-1D2E-45F5-8DC5-A75A64E20C29}" type="datetimeFigureOut">
               <a:rPr lang="en-GB" smtClean="0"/>
-              <a:t>10/10/2024</a:t>
+              <a:t>12/10/2024</a:t>
             </a:fld>
             <a:endParaRPr lang="en-GB"/>
           </a:p>
@@ -1417,7 +1417,7 @@
           <a:p>
             <a:fld id="{14389514-1D2E-45F5-8DC5-A75A64E20C29}" type="datetimeFigureOut">
               <a:rPr lang="en-GB" smtClean="0"/>
-              <a:t>10/10/2024</a:t>
+              <a:t>12/10/2024</a:t>
             </a:fld>
             <a:endParaRPr lang="en-GB"/>
           </a:p>
@@ -1832,7 +1832,7 @@
           <a:p>
             <a:fld id="{14389514-1D2E-45F5-8DC5-A75A64E20C29}" type="datetimeFigureOut">
               <a:rPr lang="en-GB" smtClean="0"/>
-              <a:t>10/10/2024</a:t>
+              <a:t>12/10/2024</a:t>
             </a:fld>
             <a:endParaRPr lang="en-GB"/>
           </a:p>
@@ -1974,7 +1974,7 @@
           <a:p>
             <a:fld id="{14389514-1D2E-45F5-8DC5-A75A64E20C29}" type="datetimeFigureOut">
               <a:rPr lang="en-GB" smtClean="0"/>
-              <a:t>10/10/2024</a:t>
+              <a:t>12/10/2024</a:t>
             </a:fld>
             <a:endParaRPr lang="en-GB"/>
           </a:p>
@@ -2087,7 +2087,7 @@
           <a:p>
             <a:fld id="{14389514-1D2E-45F5-8DC5-A75A64E20C29}" type="datetimeFigureOut">
               <a:rPr lang="en-GB" smtClean="0"/>
-              <a:t>10/10/2024</a:t>
+              <a:t>12/10/2024</a:t>
             </a:fld>
             <a:endParaRPr lang="en-GB"/>
           </a:p>
@@ -2400,7 +2400,7 @@
           <a:p>
             <a:fld id="{14389514-1D2E-45F5-8DC5-A75A64E20C29}" type="datetimeFigureOut">
               <a:rPr lang="en-GB" smtClean="0"/>
-              <a:t>10/10/2024</a:t>
+              <a:t>12/10/2024</a:t>
             </a:fld>
             <a:endParaRPr lang="en-GB"/>
           </a:p>
@@ -2689,7 +2689,7 @@
           <a:p>
             <a:fld id="{14389514-1D2E-45F5-8DC5-A75A64E20C29}" type="datetimeFigureOut">
               <a:rPr lang="en-GB" smtClean="0"/>
-              <a:t>10/10/2024</a:t>
+              <a:t>12/10/2024</a:t>
             </a:fld>
             <a:endParaRPr lang="en-GB"/>
           </a:p>
@@ -2932,7 +2932,7 @@
           <a:p>
             <a:fld id="{14389514-1D2E-45F5-8DC5-A75A64E20C29}" type="datetimeFigureOut">
               <a:rPr lang="en-GB" smtClean="0"/>
-              <a:t>10/10/2024</a:t>
+              <a:t>12/10/2024</a:t>
             </a:fld>
             <a:endParaRPr lang="en-GB"/>
           </a:p>
@@ -3735,6 +3735,51 @@
           </a:p>
         </p:txBody>
       </p:sp>
+      <p:sp>
+        <p:nvSpPr>
+          <p:cNvPr id="9" name="TextBox 8">
+            <a:extLst>
+              <a:ext uri="{FF2B5EF4-FFF2-40B4-BE49-F238E27FC236}">
+                <a16:creationId xmlns:a16="http://schemas.microsoft.com/office/drawing/2014/main" id="{7FFE56A5-10F2-A24E-E97B-1FD06E929B07}"/>
+              </a:ext>
+            </a:extLst>
+          </p:cNvPr>
+          <p:cNvSpPr txBox="1"/>
+          <p:nvPr/>
+        </p:nvSpPr>
+        <p:spPr>
+          <a:xfrm>
+            <a:off x="851297" y="2958753"/>
+            <a:ext cx="5040000" cy="1440000"/>
+          </a:xfrm>
+          <a:prstGeom prst="rect">
+            <a:avLst/>
+          </a:prstGeom>
+          <a:noFill/>
+        </p:spPr>
+        <p:txBody>
+          <a:bodyPr wrap="none" rtlCol="0" anchor="ctr">
+            <a:noAutofit/>
+          </a:bodyPr>
+          <a:lstStyle/>
+          <a:p>
+            <a:pPr algn="ctr"/>
+            <a:r>
+              <a:rPr lang="en-GB" sz="6000" dirty="0">
+                <a:ln w="0"/>
+                <a:effectLst>
+                  <a:outerShdw blurRad="38100" dist="19050" dir="2700000" algn="tl" rotWithShape="0">
+                    <a:schemeClr val="dk1">
+                      <a:alpha val="40000"/>
+                    </a:schemeClr>
+                  </a:outerShdw>
+                </a:effectLst>
+              </a:rPr>
+              <a:t>RESTRICTED ACCESS</a:t>
+            </a:r>
+          </a:p>
+        </p:txBody>
+      </p:sp>
     </p:spTree>
     <p:extLst>
       <p:ext uri="{BB962C8B-B14F-4D97-AF65-F5344CB8AC3E}">

</xml_diff>

<commit_message>
Updates to Medical Cabinet and Bookcase
</commit_message>
<xml_diff>
--- a/Assets/Textures/Roomnames/Roomnames.pptx
+++ b/Assets/Textures/Roomnames/Roomnames.pptx
@@ -8,6 +8,7 @@
     <p:sldId id="257" r:id="rId2"/>
     <p:sldId id="256" r:id="rId3"/>
     <p:sldId id="258" r:id="rId4"/>
+    <p:sldId id="259" r:id="rId5"/>
   </p:sldIdLst>
   <p:sldSz cx="12192000" cy="6858000"/>
   <p:notesSz cx="6858000" cy="9144000"/>
@@ -263,7 +264,7 @@
           <a:p>
             <a:fld id="{14389514-1D2E-45F5-8DC5-A75A64E20C29}" type="datetimeFigureOut">
               <a:rPr lang="en-GB" smtClean="0"/>
-              <a:t>12/10/2024</a:t>
+              <a:t>14/10/2024</a:t>
             </a:fld>
             <a:endParaRPr lang="en-GB"/>
           </a:p>
@@ -463,7 +464,7 @@
           <a:p>
             <a:fld id="{14389514-1D2E-45F5-8DC5-A75A64E20C29}" type="datetimeFigureOut">
               <a:rPr lang="en-GB" smtClean="0"/>
-              <a:t>12/10/2024</a:t>
+              <a:t>14/10/2024</a:t>
             </a:fld>
             <a:endParaRPr lang="en-GB"/>
           </a:p>
@@ -673,7 +674,7 @@
           <a:p>
             <a:fld id="{14389514-1D2E-45F5-8DC5-A75A64E20C29}" type="datetimeFigureOut">
               <a:rPr lang="en-GB" smtClean="0"/>
-              <a:t>12/10/2024</a:t>
+              <a:t>14/10/2024</a:t>
             </a:fld>
             <a:endParaRPr lang="en-GB"/>
           </a:p>
@@ -873,7 +874,7 @@
           <a:p>
             <a:fld id="{14389514-1D2E-45F5-8DC5-A75A64E20C29}" type="datetimeFigureOut">
               <a:rPr lang="en-GB" smtClean="0"/>
-              <a:t>12/10/2024</a:t>
+              <a:t>14/10/2024</a:t>
             </a:fld>
             <a:endParaRPr lang="en-GB"/>
           </a:p>
@@ -1149,7 +1150,7 @@
           <a:p>
             <a:fld id="{14389514-1D2E-45F5-8DC5-A75A64E20C29}" type="datetimeFigureOut">
               <a:rPr lang="en-GB" smtClean="0"/>
-              <a:t>12/10/2024</a:t>
+              <a:t>14/10/2024</a:t>
             </a:fld>
             <a:endParaRPr lang="en-GB"/>
           </a:p>
@@ -1417,7 +1418,7 @@
           <a:p>
             <a:fld id="{14389514-1D2E-45F5-8DC5-A75A64E20C29}" type="datetimeFigureOut">
               <a:rPr lang="en-GB" smtClean="0"/>
-              <a:t>12/10/2024</a:t>
+              <a:t>14/10/2024</a:t>
             </a:fld>
             <a:endParaRPr lang="en-GB"/>
           </a:p>
@@ -1832,7 +1833,7 @@
           <a:p>
             <a:fld id="{14389514-1D2E-45F5-8DC5-A75A64E20C29}" type="datetimeFigureOut">
               <a:rPr lang="en-GB" smtClean="0"/>
-              <a:t>12/10/2024</a:t>
+              <a:t>14/10/2024</a:t>
             </a:fld>
             <a:endParaRPr lang="en-GB"/>
           </a:p>
@@ -1974,7 +1975,7 @@
           <a:p>
             <a:fld id="{14389514-1D2E-45F5-8DC5-A75A64E20C29}" type="datetimeFigureOut">
               <a:rPr lang="en-GB" smtClean="0"/>
-              <a:t>12/10/2024</a:t>
+              <a:t>14/10/2024</a:t>
             </a:fld>
             <a:endParaRPr lang="en-GB"/>
           </a:p>
@@ -2087,7 +2088,7 @@
           <a:p>
             <a:fld id="{14389514-1D2E-45F5-8DC5-A75A64E20C29}" type="datetimeFigureOut">
               <a:rPr lang="en-GB" smtClean="0"/>
-              <a:t>12/10/2024</a:t>
+              <a:t>14/10/2024</a:t>
             </a:fld>
             <a:endParaRPr lang="en-GB"/>
           </a:p>
@@ -2400,7 +2401,7 @@
           <a:p>
             <a:fld id="{14389514-1D2E-45F5-8DC5-A75A64E20C29}" type="datetimeFigureOut">
               <a:rPr lang="en-GB" smtClean="0"/>
-              <a:t>12/10/2024</a:t>
+              <a:t>14/10/2024</a:t>
             </a:fld>
             <a:endParaRPr lang="en-GB"/>
           </a:p>
@@ -2689,7 +2690,7 @@
           <a:p>
             <a:fld id="{14389514-1D2E-45F5-8DC5-A75A64E20C29}" type="datetimeFigureOut">
               <a:rPr lang="en-GB" smtClean="0"/>
-              <a:t>12/10/2024</a:t>
+              <a:t>14/10/2024</a:t>
             </a:fld>
             <a:endParaRPr lang="en-GB"/>
           </a:p>
@@ -2932,7 +2933,7 @@
           <a:p>
             <a:fld id="{14389514-1D2E-45F5-8DC5-A75A64E20C29}" type="datetimeFigureOut">
               <a:rPr lang="en-GB" smtClean="0"/>
-              <a:t>12/10/2024</a:t>
+              <a:t>14/10/2024</a:t>
             </a:fld>
             <a:endParaRPr lang="en-GB"/>
           </a:p>
@@ -3969,6 +3970,778 @@
 </p:sld>
 </file>
 
+<file path=ppt/slides/slide4.xml><?xml version="1.0" encoding="utf-8"?>
+<p:sld xmlns:a="http://schemas.openxmlformats.org/drawingml/2006/main" xmlns:r="http://schemas.openxmlformats.org/officeDocument/2006/relationships" xmlns:p="http://schemas.openxmlformats.org/presentationml/2006/main">
+  <p:cSld>
+    <p:spTree>
+      <p:nvGrpSpPr>
+        <p:cNvPr id="1" name=""/>
+        <p:cNvGrpSpPr/>
+        <p:nvPr/>
+      </p:nvGrpSpPr>
+      <p:grpSpPr>
+        <a:xfrm>
+          <a:off x="0" y="0"/>
+          <a:ext cx="0" cy="0"/>
+          <a:chOff x="0" y="0"/>
+          <a:chExt cx="0" cy="0"/>
+        </a:xfrm>
+      </p:grpSpPr>
+      <p:sp>
+        <p:nvSpPr>
+          <p:cNvPr id="2" name="Rectangle: Rounded Corners 1">
+            <a:extLst>
+              <a:ext uri="{FF2B5EF4-FFF2-40B4-BE49-F238E27FC236}">
+                <a16:creationId xmlns:a16="http://schemas.microsoft.com/office/drawing/2014/main" id="{96B7F6F7-6C36-A423-552C-F05E8CD441AE}"/>
+              </a:ext>
+            </a:extLst>
+          </p:cNvPr>
+          <p:cNvSpPr/>
+          <p:nvPr/>
+        </p:nvSpPr>
+        <p:spPr>
+          <a:xfrm>
+            <a:off x="8506326" y="5696952"/>
+            <a:ext cx="1672389" cy="914400"/>
+          </a:xfrm>
+          <a:prstGeom prst="roundRect">
+            <a:avLst/>
+          </a:prstGeom>
+          <a:solidFill>
+            <a:schemeClr val="bg1"/>
+          </a:solidFill>
+          <a:ln>
+            <a:solidFill>
+              <a:schemeClr val="tx1"/>
+            </a:solidFill>
+          </a:ln>
+        </p:spPr>
+        <p:style>
+          <a:lnRef idx="2">
+            <a:schemeClr val="accent1">
+              <a:shade val="15000"/>
+            </a:schemeClr>
+          </a:lnRef>
+          <a:fillRef idx="1">
+            <a:schemeClr val="accent1"/>
+          </a:fillRef>
+          <a:effectRef idx="0">
+            <a:schemeClr val="accent1"/>
+          </a:effectRef>
+          <a:fontRef idx="minor">
+            <a:schemeClr val="lt1"/>
+          </a:fontRef>
+        </p:style>
+        <p:txBody>
+          <a:bodyPr rtlCol="0" anchor="ctr"/>
+          <a:lstStyle/>
+          <a:p>
+            <a:pPr algn="ctr"/>
+            <a:r>
+              <a:rPr lang="en-GB" sz="3600" dirty="0">
+                <a:solidFill>
+                  <a:sysClr val="windowText" lastClr="000000"/>
+                </a:solidFill>
+              </a:rPr>
+              <a:t>SCAN</a:t>
+            </a:r>
+          </a:p>
+        </p:txBody>
+      </p:sp>
+      <p:sp>
+        <p:nvSpPr>
+          <p:cNvPr id="3" name="Rectangle: Rounded Corners 2">
+            <a:extLst>
+              <a:ext uri="{FF2B5EF4-FFF2-40B4-BE49-F238E27FC236}">
+                <a16:creationId xmlns:a16="http://schemas.microsoft.com/office/drawing/2014/main" id="{CBFA1F0B-AA43-15BF-A01F-2C9B9101A932}"/>
+              </a:ext>
+            </a:extLst>
+          </p:cNvPr>
+          <p:cNvSpPr/>
+          <p:nvPr/>
+        </p:nvSpPr>
+        <p:spPr>
+          <a:xfrm>
+            <a:off x="3483143" y="2195763"/>
+            <a:ext cx="4150894" cy="914400"/>
+          </a:xfrm>
+          <a:prstGeom prst="roundRect">
+            <a:avLst>
+              <a:gd name="adj" fmla="val 0"/>
+            </a:avLst>
+          </a:prstGeom>
+          <a:solidFill>
+            <a:schemeClr val="bg1"/>
+          </a:solidFill>
+          <a:ln>
+            <a:solidFill>
+              <a:schemeClr val="tx1"/>
+            </a:solidFill>
+          </a:ln>
+        </p:spPr>
+        <p:style>
+          <a:lnRef idx="2">
+            <a:schemeClr val="accent1">
+              <a:shade val="15000"/>
+            </a:schemeClr>
+          </a:lnRef>
+          <a:fillRef idx="1">
+            <a:schemeClr val="accent1"/>
+          </a:fillRef>
+          <a:effectRef idx="0">
+            <a:schemeClr val="accent1"/>
+          </a:effectRef>
+          <a:fontRef idx="minor">
+            <a:schemeClr val="lt1"/>
+          </a:fontRef>
+        </p:style>
+        <p:txBody>
+          <a:bodyPr rtlCol="0" anchor="ctr"/>
+          <a:lstStyle/>
+          <a:p>
+            <a:r>
+              <a:rPr lang="en-GB" sz="3600" dirty="0">
+                <a:solidFill>
+                  <a:sysClr val="windowText" lastClr="000000"/>
+                </a:solidFill>
+              </a:rPr>
+              <a:t>H4095696</a:t>
+            </a:r>
+          </a:p>
+        </p:txBody>
+      </p:sp>
+      <p:sp>
+        <p:nvSpPr>
+          <p:cNvPr id="4" name="Rectangle: Rounded Corners 3">
+            <a:extLst>
+              <a:ext uri="{FF2B5EF4-FFF2-40B4-BE49-F238E27FC236}">
+                <a16:creationId xmlns:a16="http://schemas.microsoft.com/office/drawing/2014/main" id="{6B044FC1-E8B6-0734-0A04-20F100703A9C}"/>
+              </a:ext>
+            </a:extLst>
+          </p:cNvPr>
+          <p:cNvSpPr/>
+          <p:nvPr/>
+        </p:nvSpPr>
+        <p:spPr>
+          <a:xfrm>
+            <a:off x="872290" y="2195763"/>
+            <a:ext cx="2514600" cy="914400"/>
+          </a:xfrm>
+          <a:prstGeom prst="roundRect">
+            <a:avLst>
+              <a:gd name="adj" fmla="val 0"/>
+            </a:avLst>
+          </a:prstGeom>
+          <a:solidFill>
+            <a:schemeClr val="bg1"/>
+          </a:solidFill>
+          <a:ln>
+            <a:solidFill>
+              <a:schemeClr val="bg1"/>
+            </a:solidFill>
+          </a:ln>
+        </p:spPr>
+        <p:style>
+          <a:lnRef idx="2">
+            <a:schemeClr val="accent1">
+              <a:shade val="15000"/>
+            </a:schemeClr>
+          </a:lnRef>
+          <a:fillRef idx="1">
+            <a:schemeClr val="accent1"/>
+          </a:fillRef>
+          <a:effectRef idx="0">
+            <a:schemeClr val="accent1"/>
+          </a:effectRef>
+          <a:fontRef idx="minor">
+            <a:schemeClr val="lt1"/>
+          </a:fontRef>
+        </p:style>
+        <p:txBody>
+          <a:bodyPr rtlCol="0" anchor="ctr"/>
+          <a:lstStyle/>
+          <a:p>
+            <a:pPr algn="r"/>
+            <a:r>
+              <a:rPr lang="en-GB" sz="3600" dirty="0">
+                <a:solidFill>
+                  <a:sysClr val="windowText" lastClr="000000"/>
+                </a:solidFill>
+              </a:rPr>
+              <a:t>Prisoner ID:</a:t>
+            </a:r>
+          </a:p>
+        </p:txBody>
+      </p:sp>
+      <p:sp>
+        <p:nvSpPr>
+          <p:cNvPr id="5" name="Rectangle: Rounded Corners 4">
+            <a:extLst>
+              <a:ext uri="{FF2B5EF4-FFF2-40B4-BE49-F238E27FC236}">
+                <a16:creationId xmlns:a16="http://schemas.microsoft.com/office/drawing/2014/main" id="{BCE0A71C-F94E-C9D6-A7F8-194538B6B357}"/>
+              </a:ext>
+            </a:extLst>
+          </p:cNvPr>
+          <p:cNvSpPr/>
+          <p:nvPr/>
+        </p:nvSpPr>
+        <p:spPr>
+          <a:xfrm>
+            <a:off x="10371221" y="5696952"/>
+            <a:ext cx="1672389" cy="914400"/>
+          </a:xfrm>
+          <a:prstGeom prst="roundRect">
+            <a:avLst/>
+          </a:prstGeom>
+          <a:solidFill>
+            <a:schemeClr val="bg1"/>
+          </a:solidFill>
+          <a:ln>
+            <a:solidFill>
+              <a:schemeClr val="tx1"/>
+            </a:solidFill>
+          </a:ln>
+        </p:spPr>
+        <p:style>
+          <a:lnRef idx="2">
+            <a:schemeClr val="accent1">
+              <a:shade val="15000"/>
+            </a:schemeClr>
+          </a:lnRef>
+          <a:fillRef idx="1">
+            <a:schemeClr val="accent1"/>
+          </a:fillRef>
+          <a:effectRef idx="0">
+            <a:schemeClr val="accent1"/>
+          </a:effectRef>
+          <a:fontRef idx="minor">
+            <a:schemeClr val="lt1"/>
+          </a:fontRef>
+        </p:style>
+        <p:txBody>
+          <a:bodyPr rtlCol="0" anchor="ctr"/>
+          <a:lstStyle/>
+          <a:p>
+            <a:pPr algn="ctr"/>
+            <a:r>
+              <a:rPr lang="en-GB" sz="3600" dirty="0">
+                <a:solidFill>
+                  <a:sysClr val="windowText" lastClr="000000"/>
+                </a:solidFill>
+              </a:rPr>
+              <a:t>Cancel</a:t>
+            </a:r>
+          </a:p>
+        </p:txBody>
+      </p:sp>
+      <p:sp>
+        <p:nvSpPr>
+          <p:cNvPr id="6" name="Rectangle: Rounded Corners 5">
+            <a:extLst>
+              <a:ext uri="{FF2B5EF4-FFF2-40B4-BE49-F238E27FC236}">
+                <a16:creationId xmlns:a16="http://schemas.microsoft.com/office/drawing/2014/main" id="{7DC07184-0DAD-6EA4-9BA3-BBDCEC534658}"/>
+              </a:ext>
+            </a:extLst>
+          </p:cNvPr>
+          <p:cNvSpPr/>
+          <p:nvPr/>
+        </p:nvSpPr>
+        <p:spPr>
+          <a:xfrm>
+            <a:off x="3483143" y="3230478"/>
+            <a:ext cx="4150894" cy="2087479"/>
+          </a:xfrm>
+          <a:prstGeom prst="roundRect">
+            <a:avLst>
+              <a:gd name="adj" fmla="val 0"/>
+            </a:avLst>
+          </a:prstGeom>
+          <a:solidFill>
+            <a:schemeClr val="bg1"/>
+          </a:solidFill>
+          <a:ln>
+            <a:solidFill>
+              <a:schemeClr val="tx1"/>
+            </a:solidFill>
+          </a:ln>
+        </p:spPr>
+        <p:style>
+          <a:lnRef idx="2">
+            <a:schemeClr val="accent1">
+              <a:shade val="15000"/>
+            </a:schemeClr>
+          </a:lnRef>
+          <a:fillRef idx="1">
+            <a:schemeClr val="accent1"/>
+          </a:fillRef>
+          <a:effectRef idx="0">
+            <a:schemeClr val="accent1"/>
+          </a:effectRef>
+          <a:fontRef idx="minor">
+            <a:schemeClr val="lt1"/>
+          </a:fontRef>
+        </p:style>
+        <p:txBody>
+          <a:bodyPr rtlCol="0" anchor="ctr"/>
+          <a:lstStyle/>
+          <a:p>
+            <a:r>
+              <a:rPr lang="en-GB" sz="3600" dirty="0">
+                <a:solidFill>
+                  <a:sysClr val="windowText" lastClr="000000"/>
+                </a:solidFill>
+              </a:rPr>
+              <a:t>    Induction</a:t>
+            </a:r>
+          </a:p>
+          <a:p>
+            <a:r>
+              <a:rPr lang="en-GB" sz="3600" dirty="0">
+                <a:solidFill>
+                  <a:sysClr val="windowText" lastClr="000000"/>
+                </a:solidFill>
+              </a:rPr>
+              <a:t>    Annual</a:t>
+            </a:r>
+          </a:p>
+          <a:p>
+            <a:r>
+              <a:rPr lang="en-GB" sz="3600" dirty="0">
+                <a:solidFill>
+                  <a:sysClr val="windowText" lastClr="000000"/>
+                </a:solidFill>
+              </a:rPr>
+              <a:t>    Discharge</a:t>
+            </a:r>
+          </a:p>
+        </p:txBody>
+      </p:sp>
+      <p:sp>
+        <p:nvSpPr>
+          <p:cNvPr id="7" name="Rectangle: Rounded Corners 6">
+            <a:extLst>
+              <a:ext uri="{FF2B5EF4-FFF2-40B4-BE49-F238E27FC236}">
+                <a16:creationId xmlns:a16="http://schemas.microsoft.com/office/drawing/2014/main" id="{E5EC01C6-BF45-122C-9463-D60EE81C8418}"/>
+              </a:ext>
+            </a:extLst>
+          </p:cNvPr>
+          <p:cNvSpPr/>
+          <p:nvPr/>
+        </p:nvSpPr>
+        <p:spPr>
+          <a:xfrm>
+            <a:off x="872290" y="3230479"/>
+            <a:ext cx="2514600" cy="914400"/>
+          </a:xfrm>
+          <a:prstGeom prst="roundRect">
+            <a:avLst>
+              <a:gd name="adj" fmla="val 0"/>
+            </a:avLst>
+          </a:prstGeom>
+          <a:solidFill>
+            <a:schemeClr val="bg1"/>
+          </a:solidFill>
+          <a:ln>
+            <a:solidFill>
+              <a:schemeClr val="bg1"/>
+            </a:solidFill>
+          </a:ln>
+        </p:spPr>
+        <p:style>
+          <a:lnRef idx="2">
+            <a:schemeClr val="accent1">
+              <a:shade val="15000"/>
+            </a:schemeClr>
+          </a:lnRef>
+          <a:fillRef idx="1">
+            <a:schemeClr val="accent1"/>
+          </a:fillRef>
+          <a:effectRef idx="0">
+            <a:schemeClr val="accent1"/>
+          </a:effectRef>
+          <a:fontRef idx="minor">
+            <a:schemeClr val="lt1"/>
+          </a:fontRef>
+        </p:style>
+        <p:txBody>
+          <a:bodyPr rtlCol="0" anchor="ctr"/>
+          <a:lstStyle/>
+          <a:p>
+            <a:pPr algn="r"/>
+            <a:r>
+              <a:rPr lang="en-GB" sz="3600" dirty="0">
+                <a:solidFill>
+                  <a:sysClr val="windowText" lastClr="000000"/>
+                </a:solidFill>
+              </a:rPr>
+              <a:t>Scan Type:</a:t>
+            </a:r>
+          </a:p>
+        </p:txBody>
+      </p:sp>
+      <p:sp>
+        <p:nvSpPr>
+          <p:cNvPr id="8" name="Oval 7">
+            <a:extLst>
+              <a:ext uri="{FF2B5EF4-FFF2-40B4-BE49-F238E27FC236}">
+                <a16:creationId xmlns:a16="http://schemas.microsoft.com/office/drawing/2014/main" id="{8ABEAE2C-BB48-9AB0-AA80-6A59CB8A058A}"/>
+              </a:ext>
+            </a:extLst>
+          </p:cNvPr>
+          <p:cNvSpPr/>
+          <p:nvPr/>
+        </p:nvSpPr>
+        <p:spPr>
+          <a:xfrm>
+            <a:off x="3567364" y="3573379"/>
+            <a:ext cx="372979" cy="372979"/>
+          </a:xfrm>
+          <a:prstGeom prst="ellipse">
+            <a:avLst/>
+          </a:prstGeom>
+          <a:solidFill>
+            <a:schemeClr val="tx1"/>
+          </a:solidFill>
+          <a:ln>
+            <a:solidFill>
+              <a:schemeClr val="tx1"/>
+            </a:solidFill>
+          </a:ln>
+        </p:spPr>
+        <p:style>
+          <a:lnRef idx="2">
+            <a:schemeClr val="accent1">
+              <a:shade val="15000"/>
+            </a:schemeClr>
+          </a:lnRef>
+          <a:fillRef idx="1">
+            <a:schemeClr val="accent1"/>
+          </a:fillRef>
+          <a:effectRef idx="0">
+            <a:schemeClr val="accent1"/>
+          </a:effectRef>
+          <a:fontRef idx="minor">
+            <a:schemeClr val="lt1"/>
+          </a:fontRef>
+        </p:style>
+        <p:txBody>
+          <a:bodyPr rtlCol="0" anchor="ctr"/>
+          <a:lstStyle/>
+          <a:p>
+            <a:pPr algn="ctr"/>
+            <a:endParaRPr lang="en-GB"/>
+          </a:p>
+        </p:txBody>
+      </p:sp>
+      <p:sp>
+        <p:nvSpPr>
+          <p:cNvPr id="9" name="Oval 8">
+            <a:extLst>
+              <a:ext uri="{FF2B5EF4-FFF2-40B4-BE49-F238E27FC236}">
+                <a16:creationId xmlns:a16="http://schemas.microsoft.com/office/drawing/2014/main" id="{19FC0F57-CBF3-62E3-8605-91FE12CF6807}"/>
+              </a:ext>
+            </a:extLst>
+          </p:cNvPr>
+          <p:cNvSpPr/>
+          <p:nvPr/>
+        </p:nvSpPr>
+        <p:spPr>
+          <a:xfrm>
+            <a:off x="3567364" y="4144879"/>
+            <a:ext cx="372979" cy="372979"/>
+          </a:xfrm>
+          <a:prstGeom prst="ellipse">
+            <a:avLst/>
+          </a:prstGeom>
+          <a:solidFill>
+            <a:schemeClr val="bg1"/>
+          </a:solidFill>
+          <a:ln>
+            <a:solidFill>
+              <a:schemeClr val="tx1"/>
+            </a:solidFill>
+          </a:ln>
+        </p:spPr>
+        <p:style>
+          <a:lnRef idx="2">
+            <a:schemeClr val="accent1">
+              <a:shade val="15000"/>
+            </a:schemeClr>
+          </a:lnRef>
+          <a:fillRef idx="1">
+            <a:schemeClr val="accent1"/>
+          </a:fillRef>
+          <a:effectRef idx="0">
+            <a:schemeClr val="accent1"/>
+          </a:effectRef>
+          <a:fontRef idx="minor">
+            <a:schemeClr val="lt1"/>
+          </a:fontRef>
+        </p:style>
+        <p:txBody>
+          <a:bodyPr rtlCol="0" anchor="ctr"/>
+          <a:lstStyle/>
+          <a:p>
+            <a:pPr algn="ctr"/>
+            <a:endParaRPr lang="en-GB"/>
+          </a:p>
+        </p:txBody>
+      </p:sp>
+      <p:sp>
+        <p:nvSpPr>
+          <p:cNvPr id="10" name="Oval 9">
+            <a:extLst>
+              <a:ext uri="{FF2B5EF4-FFF2-40B4-BE49-F238E27FC236}">
+                <a16:creationId xmlns:a16="http://schemas.microsoft.com/office/drawing/2014/main" id="{997AD5B0-F1A0-CC26-6EC2-F94156CA7578}"/>
+              </a:ext>
+            </a:extLst>
+          </p:cNvPr>
+          <p:cNvSpPr/>
+          <p:nvPr/>
+        </p:nvSpPr>
+        <p:spPr>
+          <a:xfrm>
+            <a:off x="3567364" y="4695323"/>
+            <a:ext cx="372979" cy="372979"/>
+          </a:xfrm>
+          <a:prstGeom prst="ellipse">
+            <a:avLst/>
+          </a:prstGeom>
+          <a:solidFill>
+            <a:schemeClr val="bg1"/>
+          </a:solidFill>
+          <a:ln>
+            <a:solidFill>
+              <a:schemeClr val="tx1"/>
+            </a:solidFill>
+          </a:ln>
+        </p:spPr>
+        <p:style>
+          <a:lnRef idx="2">
+            <a:schemeClr val="accent1">
+              <a:shade val="15000"/>
+            </a:schemeClr>
+          </a:lnRef>
+          <a:fillRef idx="1">
+            <a:schemeClr val="accent1"/>
+          </a:fillRef>
+          <a:effectRef idx="0">
+            <a:schemeClr val="accent1"/>
+          </a:effectRef>
+          <a:fontRef idx="minor">
+            <a:schemeClr val="lt1"/>
+          </a:fontRef>
+        </p:style>
+        <p:txBody>
+          <a:bodyPr rtlCol="0" anchor="ctr"/>
+          <a:lstStyle/>
+          <a:p>
+            <a:pPr algn="ctr"/>
+            <a:endParaRPr lang="en-GB"/>
+          </a:p>
+        </p:txBody>
+      </p:sp>
+      <p:sp>
+        <p:nvSpPr>
+          <p:cNvPr id="11" name="Rectangle: Rounded Corners 10">
+            <a:extLst>
+              <a:ext uri="{FF2B5EF4-FFF2-40B4-BE49-F238E27FC236}">
+                <a16:creationId xmlns:a16="http://schemas.microsoft.com/office/drawing/2014/main" id="{69203E8E-3899-7DEF-B5B9-AFE6FAFB78A0}"/>
+              </a:ext>
+            </a:extLst>
+          </p:cNvPr>
+          <p:cNvSpPr/>
+          <p:nvPr/>
+        </p:nvSpPr>
+        <p:spPr>
+          <a:xfrm>
+            <a:off x="50132" y="48127"/>
+            <a:ext cx="12141868" cy="914400"/>
+          </a:xfrm>
+          <a:prstGeom prst="roundRect">
+            <a:avLst>
+              <a:gd name="adj" fmla="val 0"/>
+            </a:avLst>
+          </a:prstGeom>
+          <a:solidFill>
+            <a:schemeClr val="bg1">
+              <a:lumMod val="85000"/>
+            </a:schemeClr>
+          </a:solidFill>
+          <a:ln/>
+        </p:spPr>
+        <p:style>
+          <a:lnRef idx="2">
+            <a:schemeClr val="accent3">
+              <a:shade val="15000"/>
+            </a:schemeClr>
+          </a:lnRef>
+          <a:fillRef idx="1">
+            <a:schemeClr val="accent3"/>
+          </a:fillRef>
+          <a:effectRef idx="0">
+            <a:schemeClr val="accent3"/>
+          </a:effectRef>
+          <a:fontRef idx="minor">
+            <a:schemeClr val="lt1"/>
+          </a:fontRef>
+        </p:style>
+        <p:txBody>
+          <a:bodyPr rtlCol="0" anchor="ctr"/>
+          <a:lstStyle/>
+          <a:p>
+            <a:r>
+              <a:rPr lang="en-GB" sz="3600" dirty="0">
+                <a:solidFill>
+                  <a:sysClr val="windowText" lastClr="000000"/>
+                </a:solidFill>
+              </a:rPr>
+              <a:t>World Orbital Prison: BIOMETRIC SCANNER</a:t>
+            </a:r>
+          </a:p>
+        </p:txBody>
+      </p:sp>
+      <p:sp>
+        <p:nvSpPr>
+          <p:cNvPr id="13" name="Rectangle: Rounded Corners 12">
+            <a:extLst>
+              <a:ext uri="{FF2B5EF4-FFF2-40B4-BE49-F238E27FC236}">
+                <a16:creationId xmlns:a16="http://schemas.microsoft.com/office/drawing/2014/main" id="{C7F7EFA2-A335-FC91-4BC2-49406381FBF5}"/>
+              </a:ext>
+            </a:extLst>
+          </p:cNvPr>
+          <p:cNvSpPr/>
+          <p:nvPr/>
+        </p:nvSpPr>
+        <p:spPr>
+          <a:xfrm>
+            <a:off x="50132" y="962527"/>
+            <a:ext cx="12141868" cy="914400"/>
+          </a:xfrm>
+          <a:prstGeom prst="roundRect">
+            <a:avLst>
+              <a:gd name="adj" fmla="val 0"/>
+            </a:avLst>
+          </a:prstGeom>
+          <a:solidFill>
+            <a:schemeClr val="bg1">
+              <a:lumMod val="85000"/>
+            </a:schemeClr>
+          </a:solidFill>
+          <a:ln/>
+        </p:spPr>
+        <p:style>
+          <a:lnRef idx="2">
+            <a:schemeClr val="accent3">
+              <a:shade val="15000"/>
+            </a:schemeClr>
+          </a:lnRef>
+          <a:fillRef idx="1">
+            <a:schemeClr val="accent3"/>
+          </a:fillRef>
+          <a:effectRef idx="0">
+            <a:schemeClr val="accent3"/>
+          </a:effectRef>
+          <a:fontRef idx="minor">
+            <a:schemeClr val="lt1"/>
+          </a:fontRef>
+        </p:style>
+        <p:txBody>
+          <a:bodyPr rtlCol="0" anchor="ctr"/>
+          <a:lstStyle/>
+          <a:p>
+            <a:r>
+              <a:rPr lang="en-GB" sz="2400" dirty="0">
+                <a:solidFill>
+                  <a:sysClr val="windowText" lastClr="000000"/>
+                </a:solidFill>
+              </a:rPr>
+              <a:t>File   Home   </a:t>
+            </a:r>
+            <a:r>
+              <a:rPr lang="en-GB" sz="2400" u="sng" dirty="0">
+                <a:solidFill>
+                  <a:sysClr val="windowText" lastClr="000000"/>
+                </a:solidFill>
+              </a:rPr>
+              <a:t>Scan</a:t>
+            </a:r>
+            <a:r>
+              <a:rPr lang="en-GB" sz="2400" dirty="0">
+                <a:solidFill>
+                  <a:sysClr val="windowText" lastClr="000000"/>
+                </a:solidFill>
+              </a:rPr>
+              <a:t>   Help</a:t>
+            </a:r>
+          </a:p>
+        </p:txBody>
+      </p:sp>
+      <p:sp>
+        <p:nvSpPr>
+          <p:cNvPr id="12" name="Rectangle 11">
+            <a:extLst>
+              <a:ext uri="{FF2B5EF4-FFF2-40B4-BE49-F238E27FC236}">
+                <a16:creationId xmlns:a16="http://schemas.microsoft.com/office/drawing/2014/main" id="{B7B07077-A5CD-B898-08FF-F759CC3CAEFB}"/>
+              </a:ext>
+            </a:extLst>
+          </p:cNvPr>
+          <p:cNvSpPr/>
+          <p:nvPr/>
+        </p:nvSpPr>
+        <p:spPr>
+          <a:xfrm>
+            <a:off x="0" y="0"/>
+            <a:ext cx="12192000" cy="6858000"/>
+          </a:xfrm>
+          <a:prstGeom prst="rect">
+            <a:avLst/>
+          </a:prstGeom>
+          <a:noFill/>
+          <a:ln w="76200">
+            <a:solidFill>
+              <a:schemeClr val="tx1"/>
+            </a:solidFill>
+          </a:ln>
+        </p:spPr>
+        <p:style>
+          <a:lnRef idx="2">
+            <a:schemeClr val="accent1">
+              <a:shade val="15000"/>
+            </a:schemeClr>
+          </a:lnRef>
+          <a:fillRef idx="1">
+            <a:schemeClr val="accent1"/>
+          </a:fillRef>
+          <a:effectRef idx="0">
+            <a:schemeClr val="accent1"/>
+          </a:effectRef>
+          <a:fontRef idx="minor">
+            <a:schemeClr val="lt1"/>
+          </a:fontRef>
+        </p:style>
+        <p:txBody>
+          <a:bodyPr rtlCol="0" anchor="ctr"/>
+          <a:lstStyle/>
+          <a:p>
+            <a:pPr algn="ctr"/>
+            <a:endParaRPr lang="en-GB"/>
+          </a:p>
+        </p:txBody>
+      </p:sp>
+    </p:spTree>
+    <p:extLst>
+      <p:ext uri="{BB962C8B-B14F-4D97-AF65-F5344CB8AC3E}">
+        <p14:creationId xmlns:p14="http://schemas.microsoft.com/office/powerpoint/2010/main" val="1081667882"/>
+      </p:ext>
+    </p:extLst>
+  </p:cSld>
+  <p:clrMapOvr>
+    <a:masterClrMapping/>
+  </p:clrMapOvr>
+</p:sld>
+</file>
+
 <file path=ppt/theme/theme1.xml><?xml version="1.0" encoding="utf-8"?>
 <a:theme xmlns:a="http://schemas.openxmlformats.org/drawingml/2006/main" name="Office Theme">
   <a:themeElements>

</xml_diff>